<commit_message>
- Some small edits to text
</commit_message>
<xml_diff>
--- a/VerticalStaggering_v2.pptx
+++ b/VerticalStaggering_v2.pptx
@@ -254,7 +254,7 @@
           <a:p>
             <a:fld id="{792F34E0-32B0-3748-8119-8F44CB24345F}" type="datetimeFigureOut">
               <a:rPr lang="en-US" smtClean="0"/>
-              <a:t>4/14/17</a:t>
+              <a:t>4/24/17</a:t>
             </a:fld>
             <a:endParaRPr lang="en-US"/>
           </a:p>
@@ -419,7 +419,7 @@
           <a:p>
             <a:fld id="{792F34E0-32B0-3748-8119-8F44CB24345F}" type="datetimeFigureOut">
               <a:rPr lang="en-US" smtClean="0"/>
-              <a:t>4/14/17</a:t>
+              <a:t>4/24/17</a:t>
             </a:fld>
             <a:endParaRPr lang="en-US"/>
           </a:p>
@@ -594,7 +594,7 @@
           <a:p>
             <a:fld id="{792F34E0-32B0-3748-8119-8F44CB24345F}" type="datetimeFigureOut">
               <a:rPr lang="en-US" smtClean="0"/>
-              <a:t>4/14/17</a:t>
+              <a:t>4/24/17</a:t>
             </a:fld>
             <a:endParaRPr lang="en-US"/>
           </a:p>
@@ -759,7 +759,7 @@
           <a:p>
             <a:fld id="{792F34E0-32B0-3748-8119-8F44CB24345F}" type="datetimeFigureOut">
               <a:rPr lang="en-US" smtClean="0"/>
-              <a:t>4/14/17</a:t>
+              <a:t>4/24/17</a:t>
             </a:fld>
             <a:endParaRPr lang="en-US"/>
           </a:p>
@@ -1000,7 +1000,7 @@
           <a:p>
             <a:fld id="{792F34E0-32B0-3748-8119-8F44CB24345F}" type="datetimeFigureOut">
               <a:rPr lang="en-US" smtClean="0"/>
-              <a:t>4/14/17</a:t>
+              <a:t>4/24/17</a:t>
             </a:fld>
             <a:endParaRPr lang="en-US"/>
           </a:p>
@@ -1227,7 +1227,7 @@
           <a:p>
             <a:fld id="{792F34E0-32B0-3748-8119-8F44CB24345F}" type="datetimeFigureOut">
               <a:rPr lang="en-US" smtClean="0"/>
-              <a:t>4/14/17</a:t>
+              <a:t>4/24/17</a:t>
             </a:fld>
             <a:endParaRPr lang="en-US"/>
           </a:p>
@@ -1589,7 +1589,7 @@
           <a:p>
             <a:fld id="{792F34E0-32B0-3748-8119-8F44CB24345F}" type="datetimeFigureOut">
               <a:rPr lang="en-US" smtClean="0"/>
-              <a:t>4/14/17</a:t>
+              <a:t>4/24/17</a:t>
             </a:fld>
             <a:endParaRPr lang="en-US"/>
           </a:p>
@@ -1702,7 +1702,7 @@
           <a:p>
             <a:fld id="{792F34E0-32B0-3748-8119-8F44CB24345F}" type="datetimeFigureOut">
               <a:rPr lang="en-US" smtClean="0"/>
-              <a:t>4/14/17</a:t>
+              <a:t>4/24/17</a:t>
             </a:fld>
             <a:endParaRPr lang="en-US"/>
           </a:p>
@@ -1792,7 +1792,7 @@
           <a:p>
             <a:fld id="{792F34E0-32B0-3748-8119-8F44CB24345F}" type="datetimeFigureOut">
               <a:rPr lang="en-US" smtClean="0"/>
-              <a:t>4/14/17</a:t>
+              <a:t>4/24/17</a:t>
             </a:fld>
             <a:endParaRPr lang="en-US"/>
           </a:p>
@@ -2064,7 +2064,7 @@
           <a:p>
             <a:fld id="{792F34E0-32B0-3748-8119-8F44CB24345F}" type="datetimeFigureOut">
               <a:rPr lang="en-US" smtClean="0"/>
-              <a:t>4/14/17</a:t>
+              <a:t>4/24/17</a:t>
             </a:fld>
             <a:endParaRPr lang="en-US"/>
           </a:p>
@@ -2316,7 +2316,7 @@
           <a:p>
             <a:fld id="{792F34E0-32B0-3748-8119-8F44CB24345F}" type="datetimeFigureOut">
               <a:rPr lang="en-US" smtClean="0"/>
-              <a:t>4/14/17</a:t>
+              <a:t>4/24/17</a:t>
             </a:fld>
             <a:endParaRPr lang="en-US"/>
           </a:p>
@@ -2524,7 +2524,7 @@
           <a:p>
             <a:fld id="{792F34E0-32B0-3748-8119-8F44CB24345F}" type="datetimeFigureOut">
               <a:rPr lang="en-US" smtClean="0"/>
-              <a:t>4/14/17</a:t>
+              <a:t>4/24/17</a:t>
             </a:fld>
             <a:endParaRPr lang="en-US"/>
           </a:p>
@@ -4668,22 +4668,22 @@
       </p:pic>
       <p:pic>
         <p:nvPicPr>
-          <p:cNvPr id="10" name="Picture 9"/>
+          <p:cNvPr id="76" name="Picture 75"/>
           <p:cNvPicPr>
             <a:picLocks noChangeAspect="1"/>
           </p:cNvPicPr>
           <p:nvPr/>
         </p:nvPicPr>
         <p:blipFill>
-          <a:blip r:embed="rId6"/>
+          <a:blip r:embed="rId4"/>
           <a:stretch>
             <a:fillRect/>
           </a:stretch>
         </p:blipFill>
         <p:spPr>
           <a:xfrm>
-            <a:off x="8925633" y="4610246"/>
-            <a:ext cx="419100" cy="355600"/>
+            <a:off x="8836733" y="3417008"/>
+            <a:ext cx="596900" cy="215900"/>
           </a:xfrm>
           <a:prstGeom prst="rect">
             <a:avLst/>
@@ -4700,22 +4700,22 @@
       </p:pic>
       <p:pic>
         <p:nvPicPr>
-          <p:cNvPr id="76" name="Picture 75"/>
+          <p:cNvPr id="11" name="Picture 10"/>
           <p:cNvPicPr>
             <a:picLocks noChangeAspect="1"/>
           </p:cNvPicPr>
           <p:nvPr/>
         </p:nvPicPr>
         <p:blipFill>
-          <a:blip r:embed="rId4"/>
+          <a:blip r:embed="rId6"/>
           <a:stretch>
             <a:fillRect/>
           </a:stretch>
         </p:blipFill>
         <p:spPr>
           <a:xfrm>
-            <a:off x="8836733" y="3417008"/>
-            <a:ext cx="596900" cy="215900"/>
+            <a:off x="9065333" y="740659"/>
+            <a:ext cx="139700" cy="355600"/>
           </a:xfrm>
           <a:prstGeom prst="rect">
             <a:avLst/>
@@ -4732,22 +4732,22 @@
       </p:pic>
       <p:pic>
         <p:nvPicPr>
-          <p:cNvPr id="11" name="Picture 10"/>
+          <p:cNvPr id="7" name="Picture 6"/>
           <p:cNvPicPr>
             <a:picLocks noChangeAspect="1"/>
           </p:cNvPicPr>
           <p:nvPr/>
         </p:nvPicPr>
         <p:blipFill>
-          <a:blip r:embed="rId7"/>
+          <a:blip r:embed="rId4"/>
           <a:stretch>
             <a:fillRect/>
           </a:stretch>
         </p:blipFill>
         <p:spPr>
           <a:xfrm>
-            <a:off x="9065333" y="740659"/>
-            <a:ext cx="139700" cy="355600"/>
+            <a:off x="8836733" y="1218708"/>
+            <a:ext cx="596900" cy="215900"/>
           </a:xfrm>
           <a:prstGeom prst="rect">
             <a:avLst/>
@@ -4764,22 +4764,118 @@
       </p:pic>
       <p:pic>
         <p:nvPicPr>
-          <p:cNvPr id="7" name="Picture 6"/>
+          <p:cNvPr id="180" name="Picture 179"/>
           <p:cNvPicPr>
             <a:picLocks noChangeAspect="1"/>
           </p:cNvPicPr>
           <p:nvPr/>
         </p:nvPicPr>
         <p:blipFill>
-          <a:blip r:embed="rId4"/>
+          <a:blip r:embed="rId2"/>
           <a:stretch>
             <a:fillRect/>
           </a:stretch>
         </p:blipFill>
         <p:spPr>
           <a:xfrm>
-            <a:off x="8836733" y="1218708"/>
-            <a:ext cx="596900" cy="215900"/>
+            <a:off x="2556174" y="3788210"/>
+            <a:ext cx="215900" cy="139700"/>
+          </a:xfrm>
+          <a:prstGeom prst="rect">
+            <a:avLst/>
+          </a:prstGeom>
+          <a:solidFill>
+            <a:schemeClr val="bg1"/>
+          </a:solidFill>
+          <a:ln w="76200">
+            <a:solidFill>
+              <a:schemeClr val="bg1"/>
+            </a:solidFill>
+          </a:ln>
+        </p:spPr>
+      </p:pic>
+      <p:pic>
+        <p:nvPicPr>
+          <p:cNvPr id="181" name="Picture 180"/>
+          <p:cNvPicPr>
+            <a:picLocks noChangeAspect="1"/>
+          </p:cNvPicPr>
+          <p:nvPr/>
+        </p:nvPicPr>
+        <p:blipFill>
+          <a:blip r:embed="rId2"/>
+          <a:stretch>
+            <a:fillRect/>
+          </a:stretch>
+        </p:blipFill>
+        <p:spPr>
+          <a:xfrm>
+            <a:off x="2556174" y="840539"/>
+            <a:ext cx="215900" cy="139700"/>
+          </a:xfrm>
+          <a:prstGeom prst="rect">
+            <a:avLst/>
+          </a:prstGeom>
+          <a:solidFill>
+            <a:schemeClr val="bg1"/>
+          </a:solidFill>
+          <a:ln w="76200">
+            <a:solidFill>
+              <a:schemeClr val="bg1"/>
+            </a:solidFill>
+          </a:ln>
+        </p:spPr>
+      </p:pic>
+      <p:pic>
+        <p:nvPicPr>
+          <p:cNvPr id="183" name="Picture 182"/>
+          <p:cNvPicPr>
+            <a:picLocks noChangeAspect="1"/>
+          </p:cNvPicPr>
+          <p:nvPr/>
+        </p:nvPicPr>
+        <p:blipFill>
+          <a:blip r:embed="rId2"/>
+          <a:stretch>
+            <a:fillRect/>
+          </a:stretch>
+        </p:blipFill>
+        <p:spPr>
+          <a:xfrm>
+            <a:off x="2556174" y="3036636"/>
+            <a:ext cx="215900" cy="139700"/>
+          </a:xfrm>
+          <a:prstGeom prst="rect">
+            <a:avLst/>
+          </a:prstGeom>
+          <a:solidFill>
+            <a:schemeClr val="bg1"/>
+          </a:solidFill>
+          <a:ln w="76200">
+            <a:solidFill>
+              <a:schemeClr val="bg1"/>
+            </a:solidFill>
+          </a:ln>
+        </p:spPr>
+      </p:pic>
+      <p:pic>
+        <p:nvPicPr>
+          <p:cNvPr id="12" name="Picture 11"/>
+          <p:cNvPicPr>
+            <a:picLocks noChangeAspect="1"/>
+          </p:cNvPicPr>
+          <p:nvPr/>
+        </p:nvPicPr>
+        <p:blipFill>
+          <a:blip r:embed="rId7"/>
+          <a:stretch>
+            <a:fillRect/>
+          </a:stretch>
+        </p:blipFill>
+        <p:spPr>
+          <a:xfrm>
+            <a:off x="8839291" y="4331771"/>
+            <a:ext cx="622300" cy="266700"/>
           </a:xfrm>
           <a:prstGeom prst="rect">
             <a:avLst/>
@@ -4796,103 +4892,7 @@
       </p:pic>
       <p:pic>
         <p:nvPicPr>
-          <p:cNvPr id="180" name="Picture 179"/>
-          <p:cNvPicPr>
-            <a:picLocks noChangeAspect="1"/>
-          </p:cNvPicPr>
-          <p:nvPr/>
-        </p:nvPicPr>
-        <p:blipFill>
-          <a:blip r:embed="rId2"/>
-          <a:stretch>
-            <a:fillRect/>
-          </a:stretch>
-        </p:blipFill>
-        <p:spPr>
-          <a:xfrm>
-            <a:off x="2556174" y="3788210"/>
-            <a:ext cx="215900" cy="139700"/>
-          </a:xfrm>
-          <a:prstGeom prst="rect">
-            <a:avLst/>
-          </a:prstGeom>
-          <a:solidFill>
-            <a:schemeClr val="bg1"/>
-          </a:solidFill>
-          <a:ln w="76200">
-            <a:solidFill>
-              <a:schemeClr val="bg1"/>
-            </a:solidFill>
-          </a:ln>
-        </p:spPr>
-      </p:pic>
-      <p:pic>
-        <p:nvPicPr>
-          <p:cNvPr id="181" name="Picture 180"/>
-          <p:cNvPicPr>
-            <a:picLocks noChangeAspect="1"/>
-          </p:cNvPicPr>
-          <p:nvPr/>
-        </p:nvPicPr>
-        <p:blipFill>
-          <a:blip r:embed="rId2"/>
-          <a:stretch>
-            <a:fillRect/>
-          </a:stretch>
-        </p:blipFill>
-        <p:spPr>
-          <a:xfrm>
-            <a:off x="2556174" y="840539"/>
-            <a:ext cx="215900" cy="139700"/>
-          </a:xfrm>
-          <a:prstGeom prst="rect">
-            <a:avLst/>
-          </a:prstGeom>
-          <a:solidFill>
-            <a:schemeClr val="bg1"/>
-          </a:solidFill>
-          <a:ln w="76200">
-            <a:solidFill>
-              <a:schemeClr val="bg1"/>
-            </a:solidFill>
-          </a:ln>
-        </p:spPr>
-      </p:pic>
-      <p:pic>
-        <p:nvPicPr>
-          <p:cNvPr id="183" name="Picture 182"/>
-          <p:cNvPicPr>
-            <a:picLocks noChangeAspect="1"/>
-          </p:cNvPicPr>
-          <p:nvPr/>
-        </p:nvPicPr>
-        <p:blipFill>
-          <a:blip r:embed="rId2"/>
-          <a:stretch>
-            <a:fillRect/>
-          </a:stretch>
-        </p:blipFill>
-        <p:spPr>
-          <a:xfrm>
-            <a:off x="2556174" y="3036636"/>
-            <a:ext cx="215900" cy="139700"/>
-          </a:xfrm>
-          <a:prstGeom prst="rect">
-            <a:avLst/>
-          </a:prstGeom>
-          <a:solidFill>
-            <a:schemeClr val="bg1"/>
-          </a:solidFill>
-          <a:ln w="76200">
-            <a:solidFill>
-              <a:schemeClr val="bg1"/>
-            </a:solidFill>
-          </a:ln>
-        </p:spPr>
-      </p:pic>
-      <p:pic>
-        <p:nvPicPr>
-          <p:cNvPr id="12" name="Picture 11"/>
+          <p:cNvPr id="13" name="Picture 12"/>
           <p:cNvPicPr>
             <a:picLocks noChangeAspect="1"/>
           </p:cNvPicPr>
@@ -4906,8 +4906,8 @@
         </p:blipFill>
         <p:spPr>
           <a:xfrm>
-            <a:off x="8839291" y="4345419"/>
-            <a:ext cx="622300" cy="266700"/>
+            <a:off x="5659364" y="4596076"/>
+            <a:ext cx="596900" cy="279400"/>
           </a:xfrm>
           <a:prstGeom prst="rect">
             <a:avLst/>
@@ -4924,21 +4924,21 @@
       </p:pic>
       <p:pic>
         <p:nvPicPr>
-          <p:cNvPr id="13" name="Picture 12"/>
+          <p:cNvPr id="87" name="Picture 86"/>
           <p:cNvPicPr>
             <a:picLocks noChangeAspect="1"/>
           </p:cNvPicPr>
           <p:nvPr/>
         </p:nvPicPr>
         <p:blipFill>
-          <a:blip r:embed="rId9"/>
+          <a:blip r:embed="rId8"/>
           <a:stretch>
             <a:fillRect/>
           </a:stretch>
         </p:blipFill>
         <p:spPr>
           <a:xfrm>
-            <a:off x="5659364" y="4596076"/>
+            <a:off x="5659364" y="3714008"/>
             <a:ext cx="596900" cy="279400"/>
           </a:xfrm>
           <a:prstGeom prst="rect">
@@ -4956,21 +4956,21 @@
       </p:pic>
       <p:pic>
         <p:nvPicPr>
-          <p:cNvPr id="87" name="Picture 86"/>
+          <p:cNvPr id="88" name="Picture 87"/>
           <p:cNvPicPr>
             <a:picLocks noChangeAspect="1"/>
           </p:cNvPicPr>
           <p:nvPr/>
         </p:nvPicPr>
         <p:blipFill>
-          <a:blip r:embed="rId9"/>
+          <a:blip r:embed="rId8"/>
           <a:stretch>
             <a:fillRect/>
           </a:stretch>
         </p:blipFill>
         <p:spPr>
           <a:xfrm>
-            <a:off x="5659364" y="3714008"/>
+            <a:off x="5659364" y="2965251"/>
             <a:ext cx="596900" cy="279400"/>
           </a:xfrm>
           <a:prstGeom prst="rect">
@@ -4988,21 +4988,21 @@
       </p:pic>
       <p:pic>
         <p:nvPicPr>
-          <p:cNvPr id="88" name="Picture 87"/>
+          <p:cNvPr id="89" name="Picture 88"/>
           <p:cNvPicPr>
             <a:picLocks noChangeAspect="1"/>
           </p:cNvPicPr>
           <p:nvPr/>
         </p:nvPicPr>
         <p:blipFill>
-          <a:blip r:embed="rId9"/>
+          <a:blip r:embed="rId8"/>
           <a:stretch>
             <a:fillRect/>
           </a:stretch>
         </p:blipFill>
         <p:spPr>
           <a:xfrm>
-            <a:off x="5659364" y="2965251"/>
+            <a:off x="5659364" y="1521325"/>
             <a:ext cx="596900" cy="279400"/>
           </a:xfrm>
           <a:prstGeom prst="rect">
@@ -5020,21 +5020,21 @@
       </p:pic>
       <p:pic>
         <p:nvPicPr>
-          <p:cNvPr id="89" name="Picture 88"/>
+          <p:cNvPr id="90" name="Picture 89"/>
           <p:cNvPicPr>
             <a:picLocks noChangeAspect="1"/>
           </p:cNvPicPr>
           <p:nvPr/>
         </p:nvPicPr>
         <p:blipFill>
-          <a:blip r:embed="rId9"/>
+          <a:blip r:embed="rId8"/>
           <a:stretch>
             <a:fillRect/>
           </a:stretch>
         </p:blipFill>
         <p:spPr>
           <a:xfrm>
-            <a:off x="5659364" y="1521325"/>
+            <a:off x="5659364" y="771337"/>
             <a:ext cx="596900" cy="279400"/>
           </a:xfrm>
           <a:prstGeom prst="rect">
@@ -5052,7 +5052,7 @@
       </p:pic>
       <p:pic>
         <p:nvPicPr>
-          <p:cNvPr id="90" name="Picture 89"/>
+          <p:cNvPr id="14" name="Picture 13"/>
           <p:cNvPicPr>
             <a:picLocks noChangeAspect="1"/>
           </p:cNvPicPr>
@@ -5066,8 +5066,8 @@
         </p:blipFill>
         <p:spPr>
           <a:xfrm>
-            <a:off x="5659364" y="771337"/>
-            <a:ext cx="596900" cy="279400"/>
+            <a:off x="2175174" y="1166795"/>
+            <a:ext cx="977900" cy="292100"/>
           </a:xfrm>
           <a:prstGeom prst="rect">
             <a:avLst/>
@@ -5084,21 +5084,21 @@
       </p:pic>
       <p:pic>
         <p:nvPicPr>
-          <p:cNvPr id="14" name="Picture 13"/>
+          <p:cNvPr id="92" name="Picture 91"/>
           <p:cNvPicPr>
             <a:picLocks noChangeAspect="1"/>
           </p:cNvPicPr>
           <p:nvPr/>
         </p:nvPicPr>
         <p:blipFill>
-          <a:blip r:embed="rId10"/>
+          <a:blip r:embed="rId9"/>
           <a:stretch>
             <a:fillRect/>
           </a:stretch>
         </p:blipFill>
         <p:spPr>
           <a:xfrm>
-            <a:off x="2175174" y="1166795"/>
+            <a:off x="2175174" y="3339366"/>
             <a:ext cx="977900" cy="292100"/>
           </a:xfrm>
           <a:prstGeom prst="rect">
@@ -5116,21 +5116,21 @@
       </p:pic>
       <p:pic>
         <p:nvPicPr>
-          <p:cNvPr id="92" name="Picture 91"/>
+          <p:cNvPr id="93" name="Picture 92"/>
           <p:cNvPicPr>
             <a:picLocks noChangeAspect="1"/>
           </p:cNvPicPr>
           <p:nvPr/>
         </p:nvPicPr>
         <p:blipFill>
-          <a:blip r:embed="rId10"/>
+          <a:blip r:embed="rId9"/>
           <a:stretch>
             <a:fillRect/>
           </a:stretch>
         </p:blipFill>
         <p:spPr>
           <a:xfrm>
-            <a:off x="2175174" y="3339366"/>
+            <a:off x="2169675" y="4050366"/>
             <a:ext cx="977900" cy="292100"/>
           </a:xfrm>
           <a:prstGeom prst="rect">
@@ -5148,7 +5148,7 @@
       </p:pic>
       <p:pic>
         <p:nvPicPr>
-          <p:cNvPr id="93" name="Picture 92"/>
+          <p:cNvPr id="10" name="Picture 9"/>
           <p:cNvPicPr>
             <a:picLocks noChangeAspect="1"/>
           </p:cNvPicPr>
@@ -5162,8 +5162,8 @@
         </p:blipFill>
         <p:spPr>
           <a:xfrm>
-            <a:off x="2169675" y="4050366"/>
-            <a:ext cx="977900" cy="292100"/>
+            <a:off x="8911985" y="4610246"/>
+            <a:ext cx="419100" cy="355600"/>
           </a:xfrm>
           <a:prstGeom prst="rect">
             <a:avLst/>

</xml_diff>